<commit_message>
added input location to the cls_info file
</commit_message>
<xml_diff>
--- a/docs/user_guide_plots.pptx
+++ b/docs/user_guide_plots.pptx
@@ -6,10 +6,11 @@
   </p:sldMasterIdLst>
   <p:sldIdLst>
     <p:sldId id="261" r:id="rId2"/>
-    <p:sldId id="257" r:id="rId3"/>
-    <p:sldId id="258" r:id="rId4"/>
-    <p:sldId id="259" r:id="rId5"/>
-    <p:sldId id="260" r:id="rId6"/>
+    <p:sldId id="262" r:id="rId3"/>
+    <p:sldId id="257" r:id="rId4"/>
+    <p:sldId id="258" r:id="rId5"/>
+    <p:sldId id="259" r:id="rId6"/>
+    <p:sldId id="260" r:id="rId7"/>
   </p:sldIdLst>
   <p:sldSz cx="12192000" cy="6858000"/>
   <p:notesSz cx="6858000" cy="9144000"/>
@@ -11454,7 +11455,7 @@
           <a:p>
             <a:r>
               <a:rPr lang="en-GB" dirty="0"/>
-              <a:t>Version 0.1.0 Beta</a:t>
+              <a:t>Version 0.2.0 Beta</a:t>
             </a:r>
           </a:p>
           <a:p>
@@ -11518,10 +11519,10 @@
       </p:grpSpPr>
       <p:pic>
         <p:nvPicPr>
-          <p:cNvPr id="11" name="Picture 10">
+          <p:cNvPr id="4" name="Picture 3">
             <a:extLst>
               <a:ext uri="{FF2B5EF4-FFF2-40B4-BE49-F238E27FC236}">
-                <a16:creationId xmlns:a16="http://schemas.microsoft.com/office/drawing/2014/main" id="{F74A3281-EADB-4923-A8F3-2331F6B02962}"/>
+                <a16:creationId xmlns:a16="http://schemas.microsoft.com/office/drawing/2014/main" id="{B482282A-8A7A-8AB5-4EF1-6EA715227E0E}"/>
               </a:ext>
             </a:extLst>
           </p:cNvPr>
@@ -11531,21 +11532,15 @@
           <p:nvPr/>
         </p:nvPicPr>
         <p:blipFill>
-          <a:blip r:embed="rId2" cstate="screen">
-            <a:extLst>
-              <a:ext uri="{28A0092B-C50C-407E-A947-70E740481C1C}">
-                <a14:useLocalDpi xmlns:a14="http://schemas.microsoft.com/office/drawing/2010/main"/>
-              </a:ext>
-            </a:extLst>
-          </a:blip>
+          <a:blip r:embed="rId2"/>
           <a:stretch>
             <a:fillRect/>
           </a:stretch>
         </p:blipFill>
         <p:spPr>
           <a:xfrm>
-            <a:off x="0" y="1039874"/>
-            <a:ext cx="7873941" cy="4529235"/>
+            <a:off x="366091" y="998519"/>
+            <a:ext cx="7459127" cy="4051582"/>
           </a:xfrm>
           <a:prstGeom prst="rect">
             <a:avLst/>
@@ -11575,7 +11570,7 @@
           <a:p>
             <a:r>
               <a:rPr lang="en-GB" dirty="0"/>
-              <a:t>Simulation progression plot</a:t>
+              <a:t>All simulations summary plot</a:t>
             </a:r>
           </a:p>
         </p:txBody>
@@ -11594,7 +11589,7 @@
         </p:nvSpPr>
         <p:spPr>
           <a:xfrm>
-            <a:off x="4567406" y="874455"/>
+            <a:off x="4823884" y="925120"/>
             <a:ext cx="248129" cy="248129"/>
           </a:xfrm>
           <a:prstGeom prst="ellipse">
@@ -11641,7 +11636,7 @@
         </p:nvSpPr>
         <p:spPr>
           <a:xfrm>
-            <a:off x="5625016" y="1757456"/>
+            <a:off x="242026" y="1445222"/>
             <a:ext cx="248129" cy="248129"/>
           </a:xfrm>
           <a:prstGeom prst="ellipse">
@@ -11688,7 +11683,7 @@
         </p:nvSpPr>
         <p:spPr>
           <a:xfrm>
-            <a:off x="2827442" y="3637566"/>
+            <a:off x="875979" y="2165605"/>
             <a:ext cx="248129" cy="248129"/>
           </a:xfrm>
           <a:prstGeom prst="ellipse">
@@ -11735,7 +11730,7 @@
         </p:nvSpPr>
         <p:spPr>
           <a:xfrm>
-            <a:off x="2915513" y="4355208"/>
+            <a:off x="1248173" y="2165605"/>
             <a:ext cx="248129" cy="248129"/>
           </a:xfrm>
           <a:prstGeom prst="ellipse">
@@ -11782,7 +11777,7 @@
         </p:nvSpPr>
         <p:spPr>
           <a:xfrm>
-            <a:off x="6923097" y="3637566"/>
+            <a:off x="1767430" y="2165605"/>
             <a:ext cx="248129" cy="248129"/>
           </a:xfrm>
           <a:prstGeom prst="ellipse">
@@ -11829,7 +11824,7 @@
         </p:nvSpPr>
         <p:spPr>
           <a:xfrm>
-            <a:off x="7383360" y="3056362"/>
+            <a:off x="7450268" y="3282857"/>
             <a:ext cx="248129" cy="248129"/>
           </a:xfrm>
           <a:prstGeom prst="ellipse">
@@ -11857,7 +11852,7 @@
             <a:pPr algn="ctr"/>
             <a:r>
               <a:rPr lang="en-GB" sz="1200" dirty="0"/>
-              <a:t>6</a:t>
+              <a:t>7</a:t>
             </a:r>
           </a:p>
         </p:txBody>
@@ -11877,7 +11872,7 @@
         <p:spPr>
           <a:xfrm>
             <a:off x="8096346" y="2005585"/>
-            <a:ext cx="3785081" cy="2554545"/>
+            <a:ext cx="3785081" cy="2308324"/>
           </a:xfrm>
           <a:prstGeom prst="rect">
             <a:avLst/>
@@ -11895,7 +11890,7 @@
             </a:pPr>
             <a:r>
               <a:rPr lang="en-GB" sz="1600" dirty="0"/>
-              <a:t>Simulation status</a:t>
+              <a:t>Time and date of the diagnostic</a:t>
             </a:r>
           </a:p>
           <a:p>
@@ -11904,7 +11899,7 @@
             </a:pPr>
             <a:r>
               <a:rPr lang="en-GB" sz="1600" dirty="0"/>
-              <a:t>Time prediction</a:t>
+              <a:t>Cluster ID / Simulation name/ User</a:t>
             </a:r>
           </a:p>
           <a:p>
@@ -11913,7 +11908,7 @@
             </a:pPr>
             <a:r>
               <a:rPr lang="en-GB" sz="1600" dirty="0"/>
-              <a:t>Simulation time incremental advancement per log (right scale) to the .out file</a:t>
+              <a:t>Simulation status</a:t>
             </a:r>
           </a:p>
           <a:p>
@@ -11922,7 +11917,7 @@
             </a:pPr>
             <a:r>
               <a:rPr lang="en-GB" sz="1600" dirty="0"/>
-              <a:t>Time difference between two successive logs to the .out file</a:t>
+              <a:t>Current time progress</a:t>
             </a:r>
           </a:p>
           <a:p>
@@ -11931,7 +11926,7 @@
             </a:pPr>
             <a:r>
               <a:rPr lang="en-GB" sz="1600" dirty="0"/>
-              <a:t>Simulation progression speed </a:t>
+              <a:t>Simulation speed</a:t>
             </a:r>
           </a:p>
           <a:p>
@@ -11940,7 +11935,68 @@
             </a:pPr>
             <a:r>
               <a:rPr lang="en-GB" sz="1600" dirty="0"/>
-              <a:t>Progression speed moving average and conf. interval based on last 30 entries</a:t>
+              <a:t>Time predictions for specific time horizon (uncertainty provided in brackets)</a:t>
+            </a:r>
+          </a:p>
+          <a:p>
+            <a:pPr marL="342900" indent="-342900">
+              <a:buAutoNum type="arabicPeriod"/>
+            </a:pPr>
+            <a:r>
+              <a:rPr lang="en-GB" sz="1600" dirty="0"/>
+              <a:t>Completion time </a:t>
+            </a:r>
+            <a:r>
+              <a:rPr lang="en-GB" sz="1600" dirty="0" err="1"/>
+              <a:t>predition</a:t>
+            </a:r>
+            <a:endParaRPr lang="en-GB" sz="1600" dirty="0"/>
+          </a:p>
+        </p:txBody>
+      </p:sp>
+      <p:sp>
+        <p:nvSpPr>
+          <p:cNvPr id="5" name="Oval 4">
+            <a:extLst>
+              <a:ext uri="{FF2B5EF4-FFF2-40B4-BE49-F238E27FC236}">
+                <a16:creationId xmlns:a16="http://schemas.microsoft.com/office/drawing/2014/main" id="{134DCE37-3CB6-D6F1-BA83-26415A68909B}"/>
+              </a:ext>
+            </a:extLst>
+          </p:cNvPr>
+          <p:cNvSpPr/>
+          <p:nvPr/>
+        </p:nvSpPr>
+        <p:spPr>
+          <a:xfrm>
+            <a:off x="5539692" y="2398632"/>
+            <a:ext cx="248129" cy="248129"/>
+          </a:xfrm>
+          <a:prstGeom prst="ellipse">
+            <a:avLst/>
+          </a:prstGeom>
+        </p:spPr>
+        <p:style>
+          <a:lnRef idx="2">
+            <a:schemeClr val="accent3"/>
+          </a:lnRef>
+          <a:fillRef idx="1">
+            <a:schemeClr val="lt1"/>
+          </a:fillRef>
+          <a:effectRef idx="0">
+            <a:schemeClr val="accent3"/>
+          </a:effectRef>
+          <a:fontRef idx="minor">
+            <a:schemeClr val="dk1"/>
+          </a:fontRef>
+        </p:style>
+        <p:txBody>
+          <a:bodyPr rtlCol="0" anchor="ctr"/>
+          <a:lstStyle/>
+          <a:p>
+            <a:pPr algn="ctr"/>
+            <a:r>
+              <a:rPr lang="en-GB" sz="1200" dirty="0"/>
+              <a:t>6</a:t>
             </a:r>
           </a:p>
         </p:txBody>
@@ -11948,7 +12004,7 @@
     </p:spTree>
     <p:extLst>
       <p:ext uri="{BB962C8B-B14F-4D97-AF65-F5344CB8AC3E}">
-        <p14:creationId xmlns:p14="http://schemas.microsoft.com/office/powerpoint/2010/main" val="607255265"/>
+        <p14:creationId xmlns:p14="http://schemas.microsoft.com/office/powerpoint/2010/main" val="824680383"/>
       </p:ext>
     </p:extLst>
   </p:cSld>
@@ -11987,40 +12043,12 @@
           <a:chExt cx="0" cy="0"/>
         </a:xfrm>
       </p:grpSpPr>
-      <p:sp>
-        <p:nvSpPr>
-          <p:cNvPr id="2" name="Title 1">
+      <p:pic>
+        <p:nvPicPr>
+          <p:cNvPr id="11" name="Picture 10">
             <a:extLst>
               <a:ext uri="{FF2B5EF4-FFF2-40B4-BE49-F238E27FC236}">
-                <a16:creationId xmlns:a16="http://schemas.microsoft.com/office/drawing/2014/main" id="{DBCE46B8-FF4A-4BB5-BC6B-66E5AE81BC1E}"/>
-              </a:ext>
-            </a:extLst>
-          </p:cNvPr>
-          <p:cNvSpPr>
-            <a:spLocks noGrp="1"/>
-          </p:cNvSpPr>
-          <p:nvPr>
-            <p:ph type="title"/>
-          </p:nvPr>
-        </p:nvSpPr>
-        <p:spPr/>
-        <p:txBody>
-          <a:bodyPr/>
-          <a:lstStyle/>
-          <a:p>
-            <a:r>
-              <a:rPr lang="en-GB" dirty="0"/>
-              <a:t>Mesh based plots</a:t>
-            </a:r>
-          </a:p>
-        </p:txBody>
-      </p:sp>
-      <p:pic>
-        <p:nvPicPr>
-          <p:cNvPr id="5" name="Picture 4">
-            <a:extLst>
-              <a:ext uri="{FF2B5EF4-FFF2-40B4-BE49-F238E27FC236}">
-                <a16:creationId xmlns:a16="http://schemas.microsoft.com/office/drawing/2014/main" id="{C038C907-5C12-4C4C-BD00-F79970310914}"/>
+                <a16:creationId xmlns:a16="http://schemas.microsoft.com/office/drawing/2014/main" id="{F74A3281-EADB-4923-A8F3-2331F6B02962}"/>
               </a:ext>
             </a:extLst>
           </p:cNvPr>
@@ -12043,8 +12071,8 @@
         </p:blipFill>
         <p:spPr>
           <a:xfrm>
-            <a:off x="90402" y="748980"/>
-            <a:ext cx="8177780" cy="4810939"/>
+            <a:off x="0" y="1039874"/>
+            <a:ext cx="7873941" cy="4529235"/>
           </a:xfrm>
           <a:prstGeom prst="rect">
             <a:avLst/>
@@ -12053,10 +12081,38 @@
       </p:pic>
       <p:sp>
         <p:nvSpPr>
-          <p:cNvPr id="6" name="Oval 5">
+          <p:cNvPr id="2" name="Title 1">
             <a:extLst>
               <a:ext uri="{FF2B5EF4-FFF2-40B4-BE49-F238E27FC236}">
-                <a16:creationId xmlns:a16="http://schemas.microsoft.com/office/drawing/2014/main" id="{8BCA61FF-6827-49F2-9137-CD674BA4CA7F}"/>
+                <a16:creationId xmlns:a16="http://schemas.microsoft.com/office/drawing/2014/main" id="{DBCE46B8-FF4A-4BB5-BC6B-66E5AE81BC1E}"/>
+              </a:ext>
+            </a:extLst>
+          </p:cNvPr>
+          <p:cNvSpPr>
+            <a:spLocks noGrp="1"/>
+          </p:cNvSpPr>
+          <p:nvPr>
+            <p:ph type="title"/>
+          </p:nvPr>
+        </p:nvSpPr>
+        <p:spPr/>
+        <p:txBody>
+          <a:bodyPr/>
+          <a:lstStyle/>
+          <a:p>
+            <a:r>
+              <a:rPr lang="en-GB" dirty="0"/>
+              <a:t>Simulation progression plot</a:t>
+            </a:r>
+          </a:p>
+        </p:txBody>
+      </p:sp>
+      <p:sp>
+        <p:nvSpPr>
+          <p:cNvPr id="7" name="Oval 6">
+            <a:extLst>
+              <a:ext uri="{FF2B5EF4-FFF2-40B4-BE49-F238E27FC236}">
+                <a16:creationId xmlns:a16="http://schemas.microsoft.com/office/drawing/2014/main" id="{F26015F4-5825-46DC-81B6-EA41DA15D7D6}"/>
               </a:ext>
             </a:extLst>
           </p:cNvPr>
@@ -12065,7 +12121,7 @@
         </p:nvSpPr>
         <p:spPr>
           <a:xfrm>
-            <a:off x="1851776" y="3222487"/>
+            <a:off x="4567406" y="874455"/>
             <a:ext cx="248129" cy="248129"/>
           </a:xfrm>
           <a:prstGeom prst="ellipse">
@@ -12093,54 +12149,7 @@
             <a:pPr algn="ctr"/>
             <a:r>
               <a:rPr lang="en-GB" sz="1200" dirty="0"/>
-              <a:t>2</a:t>
-            </a:r>
-          </a:p>
-        </p:txBody>
-      </p:sp>
-      <p:sp>
-        <p:nvSpPr>
-          <p:cNvPr id="7" name="TextBox 6">
-            <a:extLst>
-              <a:ext uri="{FF2B5EF4-FFF2-40B4-BE49-F238E27FC236}">
-                <a16:creationId xmlns:a16="http://schemas.microsoft.com/office/drawing/2014/main" id="{17E34BB3-3F9D-48BA-941B-91451BCECB7B}"/>
-              </a:ext>
-            </a:extLst>
-          </p:cNvPr>
-          <p:cNvSpPr txBox="1"/>
-          <p:nvPr/>
-        </p:nvSpPr>
-        <p:spPr>
-          <a:xfrm>
-            <a:off x="8264225" y="2314546"/>
-            <a:ext cx="3694679" cy="1815882"/>
-          </a:xfrm>
-          <a:prstGeom prst="rect">
-            <a:avLst/>
-          </a:prstGeom>
-          <a:noFill/>
-        </p:spPr>
-        <p:txBody>
-          <a:bodyPr wrap="square" rtlCol="0">
-            <a:spAutoFit/>
-          </a:bodyPr>
-          <a:lstStyle/>
-          <a:p>
-            <a:pPr marL="342900" indent="-342900">
-              <a:buAutoNum type="arabicPeriod"/>
-            </a:pPr>
-            <a:r>
-              <a:rPr lang="en-GB" sz="1600" dirty="0"/>
-              <a:t>All plots are based on min or max value for the respective parameter of interest</a:t>
-            </a:r>
-          </a:p>
-          <a:p>
-            <a:pPr marL="342900" indent="-342900">
-              <a:buAutoNum type="arabicPeriod"/>
-            </a:pPr>
-            <a:r>
-              <a:rPr lang="en-GB" sz="1600" dirty="0"/>
-              <a:t>When quantity is mesh dependant colour coding represent the corresponding mesh to which the plotted value belongs</a:t>
+              <a:t>1</a:t>
             </a:r>
           </a:p>
         </p:txBody>
@@ -12150,7 +12159,7 @@
           <p:cNvPr id="8" name="Oval 7">
             <a:extLst>
               <a:ext uri="{FF2B5EF4-FFF2-40B4-BE49-F238E27FC236}">
-                <a16:creationId xmlns:a16="http://schemas.microsoft.com/office/drawing/2014/main" id="{64686C23-00CE-4169-AE20-5FEBDE4763FC}"/>
+                <a16:creationId xmlns:a16="http://schemas.microsoft.com/office/drawing/2014/main" id="{B484B7B6-F6BF-45A2-9147-9036DADF52AE}"/>
               </a:ext>
             </a:extLst>
           </p:cNvPr>
@@ -12159,7 +12168,7 @@
         </p:nvSpPr>
         <p:spPr>
           <a:xfrm>
-            <a:off x="4926580" y="624915"/>
+            <a:off x="5625016" y="1757456"/>
             <a:ext cx="248129" cy="248129"/>
           </a:xfrm>
           <a:prstGeom prst="ellipse">
@@ -12187,7 +12196,278 @@
             <a:pPr algn="ctr"/>
             <a:r>
               <a:rPr lang="en-GB" sz="1200" dirty="0"/>
-              <a:t>1</a:t>
+              <a:t>2</a:t>
+            </a:r>
+          </a:p>
+        </p:txBody>
+      </p:sp>
+      <p:sp>
+        <p:nvSpPr>
+          <p:cNvPr id="9" name="Oval 8">
+            <a:extLst>
+              <a:ext uri="{FF2B5EF4-FFF2-40B4-BE49-F238E27FC236}">
+                <a16:creationId xmlns:a16="http://schemas.microsoft.com/office/drawing/2014/main" id="{BC750B10-6C4C-496A-A15C-BA9474F31670}"/>
+              </a:ext>
+            </a:extLst>
+          </p:cNvPr>
+          <p:cNvSpPr/>
+          <p:nvPr/>
+        </p:nvSpPr>
+        <p:spPr>
+          <a:xfrm>
+            <a:off x="2827442" y="3637566"/>
+            <a:ext cx="248129" cy="248129"/>
+          </a:xfrm>
+          <a:prstGeom prst="ellipse">
+            <a:avLst/>
+          </a:prstGeom>
+        </p:spPr>
+        <p:style>
+          <a:lnRef idx="2">
+            <a:schemeClr val="accent3"/>
+          </a:lnRef>
+          <a:fillRef idx="1">
+            <a:schemeClr val="lt1"/>
+          </a:fillRef>
+          <a:effectRef idx="0">
+            <a:schemeClr val="accent3"/>
+          </a:effectRef>
+          <a:fontRef idx="minor">
+            <a:schemeClr val="dk1"/>
+          </a:fontRef>
+        </p:style>
+        <p:txBody>
+          <a:bodyPr rtlCol="0" anchor="ctr"/>
+          <a:lstStyle/>
+          <a:p>
+            <a:pPr algn="ctr"/>
+            <a:r>
+              <a:rPr lang="en-GB" sz="1200" dirty="0"/>
+              <a:t>3</a:t>
+            </a:r>
+          </a:p>
+        </p:txBody>
+      </p:sp>
+      <p:sp>
+        <p:nvSpPr>
+          <p:cNvPr id="12" name="Oval 11">
+            <a:extLst>
+              <a:ext uri="{FF2B5EF4-FFF2-40B4-BE49-F238E27FC236}">
+                <a16:creationId xmlns:a16="http://schemas.microsoft.com/office/drawing/2014/main" id="{FDB0961C-8C79-4E3F-852D-B1833793958A}"/>
+              </a:ext>
+            </a:extLst>
+          </p:cNvPr>
+          <p:cNvSpPr/>
+          <p:nvPr/>
+        </p:nvSpPr>
+        <p:spPr>
+          <a:xfrm>
+            <a:off x="2915513" y="4355208"/>
+            <a:ext cx="248129" cy="248129"/>
+          </a:xfrm>
+          <a:prstGeom prst="ellipse">
+            <a:avLst/>
+          </a:prstGeom>
+        </p:spPr>
+        <p:style>
+          <a:lnRef idx="2">
+            <a:schemeClr val="accent3"/>
+          </a:lnRef>
+          <a:fillRef idx="1">
+            <a:schemeClr val="lt1"/>
+          </a:fillRef>
+          <a:effectRef idx="0">
+            <a:schemeClr val="accent3"/>
+          </a:effectRef>
+          <a:fontRef idx="minor">
+            <a:schemeClr val="dk1"/>
+          </a:fontRef>
+        </p:style>
+        <p:txBody>
+          <a:bodyPr rtlCol="0" anchor="ctr"/>
+          <a:lstStyle/>
+          <a:p>
+            <a:pPr algn="ctr"/>
+            <a:r>
+              <a:rPr lang="en-GB" sz="1200" dirty="0"/>
+              <a:t>4</a:t>
+            </a:r>
+          </a:p>
+        </p:txBody>
+      </p:sp>
+      <p:sp>
+        <p:nvSpPr>
+          <p:cNvPr id="13" name="Oval 12">
+            <a:extLst>
+              <a:ext uri="{FF2B5EF4-FFF2-40B4-BE49-F238E27FC236}">
+                <a16:creationId xmlns:a16="http://schemas.microsoft.com/office/drawing/2014/main" id="{E89208BE-CC45-46FF-B220-BCB9787A7F8D}"/>
+              </a:ext>
+            </a:extLst>
+          </p:cNvPr>
+          <p:cNvSpPr/>
+          <p:nvPr/>
+        </p:nvSpPr>
+        <p:spPr>
+          <a:xfrm>
+            <a:off x="6923097" y="3637566"/>
+            <a:ext cx="248129" cy="248129"/>
+          </a:xfrm>
+          <a:prstGeom prst="ellipse">
+            <a:avLst/>
+          </a:prstGeom>
+        </p:spPr>
+        <p:style>
+          <a:lnRef idx="2">
+            <a:schemeClr val="accent3"/>
+          </a:lnRef>
+          <a:fillRef idx="1">
+            <a:schemeClr val="lt1"/>
+          </a:fillRef>
+          <a:effectRef idx="0">
+            <a:schemeClr val="accent3"/>
+          </a:effectRef>
+          <a:fontRef idx="minor">
+            <a:schemeClr val="dk1"/>
+          </a:fontRef>
+        </p:style>
+        <p:txBody>
+          <a:bodyPr rtlCol="0" anchor="ctr"/>
+          <a:lstStyle/>
+          <a:p>
+            <a:pPr algn="ctr"/>
+            <a:r>
+              <a:rPr lang="en-GB" sz="1200" dirty="0"/>
+              <a:t>5</a:t>
+            </a:r>
+          </a:p>
+        </p:txBody>
+      </p:sp>
+      <p:sp>
+        <p:nvSpPr>
+          <p:cNvPr id="14" name="Oval 13">
+            <a:extLst>
+              <a:ext uri="{FF2B5EF4-FFF2-40B4-BE49-F238E27FC236}">
+                <a16:creationId xmlns:a16="http://schemas.microsoft.com/office/drawing/2014/main" id="{A395E10A-4A95-49EA-B2C1-6D0EA0034947}"/>
+              </a:ext>
+            </a:extLst>
+          </p:cNvPr>
+          <p:cNvSpPr/>
+          <p:nvPr/>
+        </p:nvSpPr>
+        <p:spPr>
+          <a:xfrm>
+            <a:off x="7383360" y="3056362"/>
+            <a:ext cx="248129" cy="248129"/>
+          </a:xfrm>
+          <a:prstGeom prst="ellipse">
+            <a:avLst/>
+          </a:prstGeom>
+        </p:spPr>
+        <p:style>
+          <a:lnRef idx="2">
+            <a:schemeClr val="accent3"/>
+          </a:lnRef>
+          <a:fillRef idx="1">
+            <a:schemeClr val="lt1"/>
+          </a:fillRef>
+          <a:effectRef idx="0">
+            <a:schemeClr val="accent3"/>
+          </a:effectRef>
+          <a:fontRef idx="minor">
+            <a:schemeClr val="dk1"/>
+          </a:fontRef>
+        </p:style>
+        <p:txBody>
+          <a:bodyPr rtlCol="0" anchor="ctr"/>
+          <a:lstStyle/>
+          <a:p>
+            <a:pPr algn="ctr"/>
+            <a:r>
+              <a:rPr lang="en-GB" sz="1200" dirty="0"/>
+              <a:t>6</a:t>
+            </a:r>
+          </a:p>
+        </p:txBody>
+      </p:sp>
+      <p:sp>
+        <p:nvSpPr>
+          <p:cNvPr id="15" name="TextBox 14">
+            <a:extLst>
+              <a:ext uri="{FF2B5EF4-FFF2-40B4-BE49-F238E27FC236}">
+                <a16:creationId xmlns:a16="http://schemas.microsoft.com/office/drawing/2014/main" id="{ED52A656-9EBF-4A64-A483-6C8983D36502}"/>
+              </a:ext>
+            </a:extLst>
+          </p:cNvPr>
+          <p:cNvSpPr txBox="1"/>
+          <p:nvPr/>
+        </p:nvSpPr>
+        <p:spPr>
+          <a:xfrm>
+            <a:off x="8096346" y="2005585"/>
+            <a:ext cx="3785081" cy="2554545"/>
+          </a:xfrm>
+          <a:prstGeom prst="rect">
+            <a:avLst/>
+          </a:prstGeom>
+          <a:noFill/>
+        </p:spPr>
+        <p:txBody>
+          <a:bodyPr wrap="square" rtlCol="0">
+            <a:spAutoFit/>
+          </a:bodyPr>
+          <a:lstStyle/>
+          <a:p>
+            <a:pPr marL="342900" indent="-342900">
+              <a:buAutoNum type="arabicPeriod"/>
+            </a:pPr>
+            <a:r>
+              <a:rPr lang="en-GB" sz="1600" dirty="0"/>
+              <a:t>Simulation status</a:t>
+            </a:r>
+          </a:p>
+          <a:p>
+            <a:pPr marL="342900" indent="-342900">
+              <a:buAutoNum type="arabicPeriod"/>
+            </a:pPr>
+            <a:r>
+              <a:rPr lang="en-GB" sz="1600" dirty="0"/>
+              <a:t>Time prediction</a:t>
+            </a:r>
+          </a:p>
+          <a:p>
+            <a:pPr marL="342900" indent="-342900">
+              <a:buAutoNum type="arabicPeriod"/>
+            </a:pPr>
+            <a:r>
+              <a:rPr lang="en-GB" sz="1600" dirty="0"/>
+              <a:t>Simulation time incremental advancement per log (right scale) to the .out file</a:t>
+            </a:r>
+          </a:p>
+          <a:p>
+            <a:pPr marL="342900" indent="-342900">
+              <a:buAutoNum type="arabicPeriod"/>
+            </a:pPr>
+            <a:r>
+              <a:rPr lang="en-GB" sz="1600" dirty="0"/>
+              <a:t>Time difference between two successive logs to the .out file</a:t>
+            </a:r>
+          </a:p>
+          <a:p>
+            <a:pPr marL="342900" indent="-342900">
+              <a:buAutoNum type="arabicPeriod"/>
+            </a:pPr>
+            <a:r>
+              <a:rPr lang="en-GB" sz="1600" dirty="0"/>
+              <a:t>Simulation progression speed </a:t>
+            </a:r>
+          </a:p>
+          <a:p>
+            <a:pPr marL="342900" indent="-342900">
+              <a:buAutoNum type="arabicPeriod"/>
+            </a:pPr>
+            <a:r>
+              <a:rPr lang="en-GB" sz="1600" dirty="0"/>
+              <a:t>Progression speed moving average and conf. interval based on last 30 entries</a:t>
             </a:r>
           </a:p>
         </p:txBody>
@@ -12195,7 +12475,7 @@
     </p:spTree>
     <p:extLst>
       <p:ext uri="{BB962C8B-B14F-4D97-AF65-F5344CB8AC3E}">
-        <p14:creationId xmlns:p14="http://schemas.microsoft.com/office/powerpoint/2010/main" val="2950455894"/>
+        <p14:creationId xmlns:p14="http://schemas.microsoft.com/office/powerpoint/2010/main" val="607255265"/>
       </p:ext>
     </p:extLst>
   </p:cSld>
@@ -12257,6 +12537,253 @@
           <a:p>
             <a:r>
               <a:rPr lang="en-GB" dirty="0"/>
+              <a:t>Mesh based plots</a:t>
+            </a:r>
+          </a:p>
+        </p:txBody>
+      </p:sp>
+      <p:pic>
+        <p:nvPicPr>
+          <p:cNvPr id="5" name="Picture 4">
+            <a:extLst>
+              <a:ext uri="{FF2B5EF4-FFF2-40B4-BE49-F238E27FC236}">
+                <a16:creationId xmlns:a16="http://schemas.microsoft.com/office/drawing/2014/main" id="{C038C907-5C12-4C4C-BD00-F79970310914}"/>
+              </a:ext>
+            </a:extLst>
+          </p:cNvPr>
+          <p:cNvPicPr>
+            <a:picLocks noChangeAspect="1"/>
+          </p:cNvPicPr>
+          <p:nvPr/>
+        </p:nvPicPr>
+        <p:blipFill>
+          <a:blip r:embed="rId2" cstate="screen">
+            <a:extLst>
+              <a:ext uri="{28A0092B-C50C-407E-A947-70E740481C1C}">
+                <a14:useLocalDpi xmlns:a14="http://schemas.microsoft.com/office/drawing/2010/main"/>
+              </a:ext>
+            </a:extLst>
+          </a:blip>
+          <a:stretch>
+            <a:fillRect/>
+          </a:stretch>
+        </p:blipFill>
+        <p:spPr>
+          <a:xfrm>
+            <a:off x="90402" y="748980"/>
+            <a:ext cx="8177780" cy="4810939"/>
+          </a:xfrm>
+          <a:prstGeom prst="rect">
+            <a:avLst/>
+          </a:prstGeom>
+        </p:spPr>
+      </p:pic>
+      <p:sp>
+        <p:nvSpPr>
+          <p:cNvPr id="6" name="Oval 5">
+            <a:extLst>
+              <a:ext uri="{FF2B5EF4-FFF2-40B4-BE49-F238E27FC236}">
+                <a16:creationId xmlns:a16="http://schemas.microsoft.com/office/drawing/2014/main" id="{8BCA61FF-6827-49F2-9137-CD674BA4CA7F}"/>
+              </a:ext>
+            </a:extLst>
+          </p:cNvPr>
+          <p:cNvSpPr/>
+          <p:nvPr/>
+        </p:nvSpPr>
+        <p:spPr>
+          <a:xfrm>
+            <a:off x="1851776" y="3222487"/>
+            <a:ext cx="248129" cy="248129"/>
+          </a:xfrm>
+          <a:prstGeom prst="ellipse">
+            <a:avLst/>
+          </a:prstGeom>
+        </p:spPr>
+        <p:style>
+          <a:lnRef idx="2">
+            <a:schemeClr val="accent3"/>
+          </a:lnRef>
+          <a:fillRef idx="1">
+            <a:schemeClr val="lt1"/>
+          </a:fillRef>
+          <a:effectRef idx="0">
+            <a:schemeClr val="accent3"/>
+          </a:effectRef>
+          <a:fontRef idx="minor">
+            <a:schemeClr val="dk1"/>
+          </a:fontRef>
+        </p:style>
+        <p:txBody>
+          <a:bodyPr rtlCol="0" anchor="ctr"/>
+          <a:lstStyle/>
+          <a:p>
+            <a:pPr algn="ctr"/>
+            <a:r>
+              <a:rPr lang="en-GB" sz="1200" dirty="0"/>
+              <a:t>2</a:t>
+            </a:r>
+          </a:p>
+        </p:txBody>
+      </p:sp>
+      <p:sp>
+        <p:nvSpPr>
+          <p:cNvPr id="7" name="TextBox 6">
+            <a:extLst>
+              <a:ext uri="{FF2B5EF4-FFF2-40B4-BE49-F238E27FC236}">
+                <a16:creationId xmlns:a16="http://schemas.microsoft.com/office/drawing/2014/main" id="{17E34BB3-3F9D-48BA-941B-91451BCECB7B}"/>
+              </a:ext>
+            </a:extLst>
+          </p:cNvPr>
+          <p:cNvSpPr txBox="1"/>
+          <p:nvPr/>
+        </p:nvSpPr>
+        <p:spPr>
+          <a:xfrm>
+            <a:off x="8264225" y="2314546"/>
+            <a:ext cx="3694679" cy="1815882"/>
+          </a:xfrm>
+          <a:prstGeom prst="rect">
+            <a:avLst/>
+          </a:prstGeom>
+          <a:noFill/>
+        </p:spPr>
+        <p:txBody>
+          <a:bodyPr wrap="square" rtlCol="0">
+            <a:spAutoFit/>
+          </a:bodyPr>
+          <a:lstStyle/>
+          <a:p>
+            <a:pPr marL="342900" indent="-342900">
+              <a:buAutoNum type="arabicPeriod"/>
+            </a:pPr>
+            <a:r>
+              <a:rPr lang="en-GB" sz="1600" dirty="0"/>
+              <a:t>All plots are based on min or max value for the respective parameter of interest</a:t>
+            </a:r>
+          </a:p>
+          <a:p>
+            <a:pPr marL="342900" indent="-342900">
+              <a:buAutoNum type="arabicPeriod"/>
+            </a:pPr>
+            <a:r>
+              <a:rPr lang="en-GB" sz="1600" dirty="0"/>
+              <a:t>When quantity is mesh dependant colour coding represent the corresponding mesh to which the plotted value belongs</a:t>
+            </a:r>
+          </a:p>
+        </p:txBody>
+      </p:sp>
+      <p:sp>
+        <p:nvSpPr>
+          <p:cNvPr id="8" name="Oval 7">
+            <a:extLst>
+              <a:ext uri="{FF2B5EF4-FFF2-40B4-BE49-F238E27FC236}">
+                <a16:creationId xmlns:a16="http://schemas.microsoft.com/office/drawing/2014/main" id="{64686C23-00CE-4169-AE20-5FEBDE4763FC}"/>
+              </a:ext>
+            </a:extLst>
+          </p:cNvPr>
+          <p:cNvSpPr/>
+          <p:nvPr/>
+        </p:nvSpPr>
+        <p:spPr>
+          <a:xfrm>
+            <a:off x="4926580" y="624915"/>
+            <a:ext cx="248129" cy="248129"/>
+          </a:xfrm>
+          <a:prstGeom prst="ellipse">
+            <a:avLst/>
+          </a:prstGeom>
+        </p:spPr>
+        <p:style>
+          <a:lnRef idx="2">
+            <a:schemeClr val="accent3"/>
+          </a:lnRef>
+          <a:fillRef idx="1">
+            <a:schemeClr val="lt1"/>
+          </a:fillRef>
+          <a:effectRef idx="0">
+            <a:schemeClr val="accent3"/>
+          </a:effectRef>
+          <a:fontRef idx="minor">
+            <a:schemeClr val="dk1"/>
+          </a:fontRef>
+        </p:style>
+        <p:txBody>
+          <a:bodyPr rtlCol="0" anchor="ctr"/>
+          <a:lstStyle/>
+          <a:p>
+            <a:pPr algn="ctr"/>
+            <a:r>
+              <a:rPr lang="en-GB" sz="1200" dirty="0"/>
+              <a:t>1</a:t>
+            </a:r>
+          </a:p>
+        </p:txBody>
+      </p:sp>
+    </p:spTree>
+    <p:extLst>
+      <p:ext uri="{BB962C8B-B14F-4D97-AF65-F5344CB8AC3E}">
+        <p14:creationId xmlns:p14="http://schemas.microsoft.com/office/powerpoint/2010/main" val="2950455894"/>
+      </p:ext>
+    </p:extLst>
+  </p:cSld>
+  <p:clrMapOvr>
+    <a:masterClrMapping/>
+  </p:clrMapOvr>
+  <mc:AlternateContent xmlns:mc="http://schemas.openxmlformats.org/markup-compatibility/2006" xmlns:p14="http://schemas.microsoft.com/office/powerpoint/2010/main">
+    <mc:Choice Requires="p14">
+      <p:transition spd="med" p14:dur="700">
+        <p:fade/>
+      </p:transition>
+    </mc:Choice>
+    <mc:Fallback xmlns="">
+      <p:transition spd="med">
+        <p:fade/>
+      </p:transition>
+    </mc:Fallback>
+  </mc:AlternateContent>
+</p:sld>
+</file>
+
+<file path=ppt/slides/slide5.xml><?xml version="1.0" encoding="utf-8"?>
+<p:sld xmlns:a="http://schemas.openxmlformats.org/drawingml/2006/main" xmlns:r="http://schemas.openxmlformats.org/officeDocument/2006/relationships" xmlns:p="http://schemas.openxmlformats.org/presentationml/2006/main">
+  <p:cSld>
+    <p:spTree>
+      <p:nvGrpSpPr>
+        <p:cNvPr id="1" name=""/>
+        <p:cNvGrpSpPr/>
+        <p:nvPr/>
+      </p:nvGrpSpPr>
+      <p:grpSpPr>
+        <a:xfrm>
+          <a:off x="0" y="0"/>
+          <a:ext cx="0" cy="0"/>
+          <a:chOff x="0" y="0"/>
+          <a:chExt cx="0" cy="0"/>
+        </a:xfrm>
+      </p:grpSpPr>
+      <p:sp>
+        <p:nvSpPr>
+          <p:cNvPr id="2" name="Title 1">
+            <a:extLst>
+              <a:ext uri="{FF2B5EF4-FFF2-40B4-BE49-F238E27FC236}">
+                <a16:creationId xmlns:a16="http://schemas.microsoft.com/office/drawing/2014/main" id="{DBCE46B8-FF4A-4BB5-BC6B-66E5AE81BC1E}"/>
+              </a:ext>
+            </a:extLst>
+          </p:cNvPr>
+          <p:cNvSpPr>
+            <a:spLocks noGrp="1"/>
+          </p:cNvSpPr>
+          <p:nvPr>
+            <p:ph type="title"/>
+          </p:nvPr>
+        </p:nvSpPr>
+        <p:spPr/>
+        <p:txBody>
+          <a:bodyPr/>
+          <a:lstStyle/>
+          <a:p>
+            <a:r>
+              <a:rPr lang="en-GB" dirty="0"/>
               <a:t>Cycle based plots</a:t>
             </a:r>
           </a:p>
@@ -12528,7 +13055,7 @@
 </p:sld>
 </file>
 
-<file path=ppt/slides/slide5.xml><?xml version="1.0" encoding="utf-8"?>
+<file path=ppt/slides/slide6.xml><?xml version="1.0" encoding="utf-8"?>
 <p:sld xmlns:a="http://schemas.openxmlformats.org/drawingml/2006/main" xmlns:r="http://schemas.openxmlformats.org/officeDocument/2006/relationships" xmlns:p="http://schemas.openxmlformats.org/presentationml/2006/main">
   <p:cSld>
     <p:spTree>
@@ -13179,4 +13706,10 @@
     </a:ext>
   </a:extLst>
 </a:theme>
+</file>
+
+<file path=docMetadata/LabelInfo.xml><?xml version="1.0" encoding="utf-8"?>
+<clbl:labelList xmlns:clbl="http://schemas.microsoft.com/office/2020/mipLabelMetadata">
+  <clbl:label id="{82fa3fd3-029b-403d-91b4-1dc930cb0e60}" enabled="1" method="Standard" siteId="{4ae48b41-0137-4599-8661-fc641fe77bea}" contentBits="0" removed="0"/>
+</clbl:labelList>
 </file>
</xml_diff>